<commit_message>
remove lib name references
</commit_message>
<xml_diff>
--- a/apresentacao-kobbit-tdc.pptx
+++ b/apresentacao-kobbit-tdc.pptx
@@ -8868,7 +8868,7 @@
           <a:p>
             <a:fld id="{6D15588E-BA69-9E40-80C3-23BDB0CF908E}" type="datetimeFigureOut">
               <a:rPr lang="en-BR" smtClean="0"/>
-              <a:t>22/05/21</a:t>
+              <a:t>25/05/21</a:t>
             </a:fld>
             <a:endParaRPr lang="en-BR"/>
           </a:p>
@@ -9760,6 +9760,90 @@
           <a:p>
             <a:fld id="{04233EC2-47E1-434D-AA76-E8CFD53804B2}" type="slidenum">
               <a:rPr lang="en-BR" smtClean="0"/>
+              <a:t>22</a:t>
+            </a:fld>
+            <a:endParaRPr lang="en-BR"/>
+          </a:p>
+        </p:txBody>
+      </p:sp>
+    </p:spTree>
+    <p:extLst>
+      <p:ext uri="{BB962C8B-B14F-4D97-AF65-F5344CB8AC3E}">
+        <p14:creationId xmlns:p14="http://schemas.microsoft.com/office/powerpoint/2010/main" val="2942440185"/>
+      </p:ext>
+    </p:extLst>
+  </p:cSld>
+  <p:clrMapOvr>
+    <a:masterClrMapping/>
+  </p:clrMapOvr>
+</p:notes>
+</file>
+
+<file path=ppt/notesSlides/notesSlide18.xml><?xml version="1.0" encoding="utf-8"?>
+<p:notes xmlns:a="http://schemas.openxmlformats.org/drawingml/2006/main" xmlns:r="http://schemas.openxmlformats.org/officeDocument/2006/relationships" xmlns:p="http://schemas.openxmlformats.org/presentationml/2006/main">
+  <p:cSld>
+    <p:spTree>
+      <p:nvGrpSpPr>
+        <p:cNvPr id="1" name=""/>
+        <p:cNvGrpSpPr/>
+        <p:nvPr/>
+      </p:nvGrpSpPr>
+      <p:grpSpPr>
+        <a:xfrm>
+          <a:off x="0" y="0"/>
+          <a:ext cx="0" cy="0"/>
+          <a:chOff x="0" y="0"/>
+          <a:chExt cx="0" cy="0"/>
+        </a:xfrm>
+      </p:grpSpPr>
+      <p:sp>
+        <p:nvSpPr>
+          <p:cNvPr id="2" name="Slide Image Placeholder 1"/>
+          <p:cNvSpPr>
+            <a:spLocks noGrp="1" noRot="1" noChangeAspect="1"/>
+          </p:cNvSpPr>
+          <p:nvPr>
+            <p:ph type="sldImg"/>
+          </p:nvPr>
+        </p:nvSpPr>
+        <p:spPr/>
+      </p:sp>
+      <p:sp>
+        <p:nvSpPr>
+          <p:cNvPr id="3" name="Notes Placeholder 2"/>
+          <p:cNvSpPr>
+            <a:spLocks noGrp="1"/>
+          </p:cNvSpPr>
+          <p:nvPr>
+            <p:ph type="body" idx="1"/>
+          </p:nvPr>
+        </p:nvSpPr>
+        <p:spPr/>
+        <p:txBody>
+          <a:bodyPr/>
+          <a:lstStyle/>
+          <a:p>
+            <a:endParaRPr lang="en-BR" dirty="0"/>
+          </a:p>
+        </p:txBody>
+      </p:sp>
+      <p:sp>
+        <p:nvSpPr>
+          <p:cNvPr id="4" name="Slide Number Placeholder 3"/>
+          <p:cNvSpPr>
+            <a:spLocks noGrp="1"/>
+          </p:cNvSpPr>
+          <p:nvPr>
+            <p:ph type="sldNum" sz="quarter" idx="5"/>
+          </p:nvPr>
+        </p:nvSpPr>
+        <p:spPr/>
+        <p:txBody>
+          <a:bodyPr/>
+          <a:lstStyle/>
+          <a:p>
+            <a:fld id="{04233EC2-47E1-434D-AA76-E8CFD53804B2}" type="slidenum">
+              <a:rPr lang="en-BR" smtClean="0"/>
               <a:t>23</a:t>
             </a:fld>
             <a:endParaRPr lang="en-BR"/>
@@ -9779,7 +9863,7 @@
 </p:notes>
 </file>
 
-<file path=ppt/notesSlides/notesSlide18.xml><?xml version="1.0" encoding="utf-8"?>
+<file path=ppt/notesSlides/notesSlide19.xml><?xml version="1.0" encoding="utf-8"?>
 <p:notes xmlns:a="http://schemas.openxmlformats.org/drawingml/2006/main" xmlns:r="http://schemas.openxmlformats.org/officeDocument/2006/relationships" xmlns:p="http://schemas.openxmlformats.org/presentationml/2006/main">
   <p:cSld>
     <p:spTree>
@@ -9844,7 +9928,7 @@
           <a:p>
             <a:fld id="{04233EC2-47E1-434D-AA76-E8CFD53804B2}" type="slidenum">
               <a:rPr lang="en-BR" smtClean="0"/>
-              <a:t>25</a:t>
+              <a:t>24</a:t>
             </a:fld>
             <a:endParaRPr lang="en-BR"/>
           </a:p>
@@ -9853,91 +9937,7 @@
     </p:spTree>
     <p:extLst>
       <p:ext uri="{BB962C8B-B14F-4D97-AF65-F5344CB8AC3E}">
-        <p14:creationId xmlns:p14="http://schemas.microsoft.com/office/powerpoint/2010/main" val="1735857629"/>
-      </p:ext>
-    </p:extLst>
-  </p:cSld>
-  <p:clrMapOvr>
-    <a:masterClrMapping/>
-  </p:clrMapOvr>
-</p:notes>
-</file>
-
-<file path=ppt/notesSlides/notesSlide19.xml><?xml version="1.0" encoding="utf-8"?>
-<p:notes xmlns:a="http://schemas.openxmlformats.org/drawingml/2006/main" xmlns:r="http://schemas.openxmlformats.org/officeDocument/2006/relationships" xmlns:p="http://schemas.openxmlformats.org/presentationml/2006/main">
-  <p:cSld>
-    <p:spTree>
-      <p:nvGrpSpPr>
-        <p:cNvPr id="1" name=""/>
-        <p:cNvGrpSpPr/>
-        <p:nvPr/>
-      </p:nvGrpSpPr>
-      <p:grpSpPr>
-        <a:xfrm>
-          <a:off x="0" y="0"/>
-          <a:ext cx="0" cy="0"/>
-          <a:chOff x="0" y="0"/>
-          <a:chExt cx="0" cy="0"/>
-        </a:xfrm>
-      </p:grpSpPr>
-      <p:sp>
-        <p:nvSpPr>
-          <p:cNvPr id="2" name="Slide Image Placeholder 1"/>
-          <p:cNvSpPr>
-            <a:spLocks noGrp="1" noRot="1" noChangeAspect="1"/>
-          </p:cNvSpPr>
-          <p:nvPr>
-            <p:ph type="sldImg"/>
-          </p:nvPr>
-        </p:nvSpPr>
-        <p:spPr/>
-      </p:sp>
-      <p:sp>
-        <p:nvSpPr>
-          <p:cNvPr id="3" name="Notes Placeholder 2"/>
-          <p:cNvSpPr>
-            <a:spLocks noGrp="1"/>
-          </p:cNvSpPr>
-          <p:nvPr>
-            <p:ph type="body" idx="1"/>
-          </p:nvPr>
-        </p:nvSpPr>
-        <p:spPr/>
-        <p:txBody>
-          <a:bodyPr/>
-          <a:lstStyle/>
-          <a:p>
-            <a:endParaRPr lang="en-BR" dirty="0"/>
-          </a:p>
-        </p:txBody>
-      </p:sp>
-      <p:sp>
-        <p:nvSpPr>
-          <p:cNvPr id="4" name="Slide Number Placeholder 3"/>
-          <p:cNvSpPr>
-            <a:spLocks noGrp="1"/>
-          </p:cNvSpPr>
-          <p:nvPr>
-            <p:ph type="sldNum" sz="quarter" idx="5"/>
-          </p:nvPr>
-        </p:nvSpPr>
-        <p:spPr/>
-        <p:txBody>
-          <a:bodyPr/>
-          <a:lstStyle/>
-          <a:p>
-            <a:fld id="{04233EC2-47E1-434D-AA76-E8CFD53804B2}" type="slidenum">
-              <a:rPr lang="en-BR" smtClean="0"/>
-              <a:t>26</a:t>
-            </a:fld>
-            <a:endParaRPr lang="en-BR"/>
-          </a:p>
-        </p:txBody>
-      </p:sp>
-    </p:spTree>
-    <p:extLst>
-      <p:ext uri="{BB962C8B-B14F-4D97-AF65-F5344CB8AC3E}">
-        <p14:creationId xmlns:p14="http://schemas.microsoft.com/office/powerpoint/2010/main" val="2327177882"/>
+        <p14:creationId xmlns:p14="http://schemas.microsoft.com/office/powerpoint/2010/main" val="3484952542"/>
       </p:ext>
     </p:extLst>
   </p:cSld>
@@ -10075,6 +10075,174 @@
           <a:bodyPr/>
           <a:lstStyle/>
           <a:p>
+            <a:endParaRPr lang="en-BR"/>
+          </a:p>
+        </p:txBody>
+      </p:sp>
+      <p:sp>
+        <p:nvSpPr>
+          <p:cNvPr id="4" name="Slide Number Placeholder 3"/>
+          <p:cNvSpPr>
+            <a:spLocks noGrp="1"/>
+          </p:cNvSpPr>
+          <p:nvPr>
+            <p:ph type="sldNum" sz="quarter" idx="5"/>
+          </p:nvPr>
+        </p:nvSpPr>
+        <p:spPr/>
+        <p:txBody>
+          <a:bodyPr/>
+          <a:lstStyle/>
+          <a:p>
+            <a:fld id="{04233EC2-47E1-434D-AA76-E8CFD53804B2}" type="slidenum">
+              <a:rPr lang="en-BR" smtClean="0"/>
+              <a:t>25</a:t>
+            </a:fld>
+            <a:endParaRPr lang="en-BR"/>
+          </a:p>
+        </p:txBody>
+      </p:sp>
+    </p:spTree>
+    <p:extLst>
+      <p:ext uri="{BB962C8B-B14F-4D97-AF65-F5344CB8AC3E}">
+        <p14:creationId xmlns:p14="http://schemas.microsoft.com/office/powerpoint/2010/main" val="1735857629"/>
+      </p:ext>
+    </p:extLst>
+  </p:cSld>
+  <p:clrMapOvr>
+    <a:masterClrMapping/>
+  </p:clrMapOvr>
+</p:notes>
+</file>
+
+<file path=ppt/notesSlides/notesSlide21.xml><?xml version="1.0" encoding="utf-8"?>
+<p:notes xmlns:a="http://schemas.openxmlformats.org/drawingml/2006/main" xmlns:r="http://schemas.openxmlformats.org/officeDocument/2006/relationships" xmlns:p="http://schemas.openxmlformats.org/presentationml/2006/main">
+  <p:cSld>
+    <p:spTree>
+      <p:nvGrpSpPr>
+        <p:cNvPr id="1" name=""/>
+        <p:cNvGrpSpPr/>
+        <p:nvPr/>
+      </p:nvGrpSpPr>
+      <p:grpSpPr>
+        <a:xfrm>
+          <a:off x="0" y="0"/>
+          <a:ext cx="0" cy="0"/>
+          <a:chOff x="0" y="0"/>
+          <a:chExt cx="0" cy="0"/>
+        </a:xfrm>
+      </p:grpSpPr>
+      <p:sp>
+        <p:nvSpPr>
+          <p:cNvPr id="2" name="Slide Image Placeholder 1"/>
+          <p:cNvSpPr>
+            <a:spLocks noGrp="1" noRot="1" noChangeAspect="1"/>
+          </p:cNvSpPr>
+          <p:nvPr>
+            <p:ph type="sldImg"/>
+          </p:nvPr>
+        </p:nvSpPr>
+        <p:spPr/>
+      </p:sp>
+      <p:sp>
+        <p:nvSpPr>
+          <p:cNvPr id="3" name="Notes Placeholder 2"/>
+          <p:cNvSpPr>
+            <a:spLocks noGrp="1"/>
+          </p:cNvSpPr>
+          <p:nvPr>
+            <p:ph type="body" idx="1"/>
+          </p:nvPr>
+        </p:nvSpPr>
+        <p:spPr/>
+        <p:txBody>
+          <a:bodyPr/>
+          <a:lstStyle/>
+          <a:p>
+            <a:endParaRPr lang="en-BR" dirty="0"/>
+          </a:p>
+        </p:txBody>
+      </p:sp>
+      <p:sp>
+        <p:nvSpPr>
+          <p:cNvPr id="4" name="Slide Number Placeholder 3"/>
+          <p:cNvSpPr>
+            <a:spLocks noGrp="1"/>
+          </p:cNvSpPr>
+          <p:nvPr>
+            <p:ph type="sldNum" sz="quarter" idx="5"/>
+          </p:nvPr>
+        </p:nvSpPr>
+        <p:spPr/>
+        <p:txBody>
+          <a:bodyPr/>
+          <a:lstStyle/>
+          <a:p>
+            <a:fld id="{04233EC2-47E1-434D-AA76-E8CFD53804B2}" type="slidenum">
+              <a:rPr lang="en-BR" smtClean="0"/>
+              <a:t>26</a:t>
+            </a:fld>
+            <a:endParaRPr lang="en-BR"/>
+          </a:p>
+        </p:txBody>
+      </p:sp>
+    </p:spTree>
+    <p:extLst>
+      <p:ext uri="{BB962C8B-B14F-4D97-AF65-F5344CB8AC3E}">
+        <p14:creationId xmlns:p14="http://schemas.microsoft.com/office/powerpoint/2010/main" val="2327177882"/>
+      </p:ext>
+    </p:extLst>
+  </p:cSld>
+  <p:clrMapOvr>
+    <a:masterClrMapping/>
+  </p:clrMapOvr>
+</p:notes>
+</file>
+
+<file path=ppt/notesSlides/notesSlide22.xml><?xml version="1.0" encoding="utf-8"?>
+<p:notes xmlns:a="http://schemas.openxmlformats.org/drawingml/2006/main" xmlns:r="http://schemas.openxmlformats.org/officeDocument/2006/relationships" xmlns:p="http://schemas.openxmlformats.org/presentationml/2006/main">
+  <p:cSld>
+    <p:spTree>
+      <p:nvGrpSpPr>
+        <p:cNvPr id="1" name=""/>
+        <p:cNvGrpSpPr/>
+        <p:nvPr/>
+      </p:nvGrpSpPr>
+      <p:grpSpPr>
+        <a:xfrm>
+          <a:off x="0" y="0"/>
+          <a:ext cx="0" cy="0"/>
+          <a:chOff x="0" y="0"/>
+          <a:chExt cx="0" cy="0"/>
+        </a:xfrm>
+      </p:grpSpPr>
+      <p:sp>
+        <p:nvSpPr>
+          <p:cNvPr id="2" name="Slide Image Placeholder 1"/>
+          <p:cNvSpPr>
+            <a:spLocks noGrp="1" noRot="1" noChangeAspect="1"/>
+          </p:cNvSpPr>
+          <p:nvPr>
+            <p:ph type="sldImg"/>
+          </p:nvPr>
+        </p:nvSpPr>
+        <p:spPr/>
+      </p:sp>
+      <p:sp>
+        <p:nvSpPr>
+          <p:cNvPr id="3" name="Notes Placeholder 2"/>
+          <p:cNvSpPr>
+            <a:spLocks noGrp="1"/>
+          </p:cNvSpPr>
+          <p:nvPr>
+            <p:ph type="body" idx="1"/>
+          </p:nvPr>
+        </p:nvSpPr>
+        <p:spPr/>
+        <p:txBody>
+          <a:bodyPr/>
+          <a:lstStyle/>
+          <a:p>
             <a:endParaRPr lang="en-BR" dirty="0"/>
           </a:p>
         </p:txBody>
@@ -10115,7 +10283,7 @@
 </p:notes>
 </file>
 
-<file path=ppt/notesSlides/notesSlide21.xml><?xml version="1.0" encoding="utf-8"?>
+<file path=ppt/notesSlides/notesSlide23.xml><?xml version="1.0" encoding="utf-8"?>
 <p:notes xmlns:a="http://schemas.openxmlformats.org/drawingml/2006/main" xmlns:r="http://schemas.openxmlformats.org/officeDocument/2006/relationships" xmlns:p="http://schemas.openxmlformats.org/presentationml/2006/main">
   <p:cSld>
     <p:spTree>
@@ -10199,7 +10367,7 @@
 </p:notes>
 </file>
 
-<file path=ppt/notesSlides/notesSlide22.xml><?xml version="1.0" encoding="utf-8"?>
+<file path=ppt/notesSlides/notesSlide24.xml><?xml version="1.0" encoding="utf-8"?>
 <p:notes xmlns:a="http://schemas.openxmlformats.org/drawingml/2006/main" xmlns:r="http://schemas.openxmlformats.org/officeDocument/2006/relationships" xmlns:p="http://schemas.openxmlformats.org/presentationml/2006/main">
   <p:cSld>
     <p:spTree>
@@ -10283,7 +10451,7 @@
 </p:notes>
 </file>
 
-<file path=ppt/notesSlides/notesSlide23.xml><?xml version="1.0" encoding="utf-8"?>
+<file path=ppt/notesSlides/notesSlide25.xml><?xml version="1.0" encoding="utf-8"?>
 <p:notes xmlns:a="http://schemas.openxmlformats.org/drawingml/2006/main" xmlns:r="http://schemas.openxmlformats.org/officeDocument/2006/relationships" xmlns:p="http://schemas.openxmlformats.org/presentationml/2006/main">
   <p:cSld>
     <p:spTree>
@@ -10991,7 +11159,7 @@
           <a:p>
             <a:fld id="{D5132B31-66C7-1348-BC89-1CFA582590C2}" type="datetimeFigureOut">
               <a:rPr lang="en-BR" smtClean="0"/>
-              <a:t>22/05/21</a:t>
+              <a:t>25/05/21</a:t>
             </a:fld>
             <a:endParaRPr lang="en-BR"/>
           </a:p>
@@ -11191,7 +11359,7 @@
           <a:p>
             <a:fld id="{D5132B31-66C7-1348-BC89-1CFA582590C2}" type="datetimeFigureOut">
               <a:rPr lang="en-BR" smtClean="0"/>
-              <a:t>22/05/21</a:t>
+              <a:t>25/05/21</a:t>
             </a:fld>
             <a:endParaRPr lang="en-BR"/>
           </a:p>
@@ -11401,7 +11569,7 @@
           <a:p>
             <a:fld id="{D5132B31-66C7-1348-BC89-1CFA582590C2}" type="datetimeFigureOut">
               <a:rPr lang="en-BR" smtClean="0"/>
-              <a:t>22/05/21</a:t>
+              <a:t>25/05/21</a:t>
             </a:fld>
             <a:endParaRPr lang="en-BR"/>
           </a:p>
@@ -11601,7 +11769,7 @@
           <a:p>
             <a:fld id="{D5132B31-66C7-1348-BC89-1CFA582590C2}" type="datetimeFigureOut">
               <a:rPr lang="en-BR" smtClean="0"/>
-              <a:t>22/05/21</a:t>
+              <a:t>25/05/21</a:t>
             </a:fld>
             <a:endParaRPr lang="en-BR"/>
           </a:p>
@@ -11877,7 +12045,7 @@
           <a:p>
             <a:fld id="{D5132B31-66C7-1348-BC89-1CFA582590C2}" type="datetimeFigureOut">
               <a:rPr lang="en-BR" smtClean="0"/>
-              <a:t>22/05/21</a:t>
+              <a:t>25/05/21</a:t>
             </a:fld>
             <a:endParaRPr lang="en-BR"/>
           </a:p>
@@ -12145,7 +12313,7 @@
           <a:p>
             <a:fld id="{D5132B31-66C7-1348-BC89-1CFA582590C2}" type="datetimeFigureOut">
               <a:rPr lang="en-BR" smtClean="0"/>
-              <a:t>22/05/21</a:t>
+              <a:t>25/05/21</a:t>
             </a:fld>
             <a:endParaRPr lang="en-BR"/>
           </a:p>
@@ -12560,7 +12728,7 @@
           <a:p>
             <a:fld id="{D5132B31-66C7-1348-BC89-1CFA582590C2}" type="datetimeFigureOut">
               <a:rPr lang="en-BR" smtClean="0"/>
-              <a:t>22/05/21</a:t>
+              <a:t>25/05/21</a:t>
             </a:fld>
             <a:endParaRPr lang="en-BR"/>
           </a:p>
@@ -12702,7 +12870,7 @@
           <a:p>
             <a:fld id="{D5132B31-66C7-1348-BC89-1CFA582590C2}" type="datetimeFigureOut">
               <a:rPr lang="en-BR" smtClean="0"/>
-              <a:t>22/05/21</a:t>
+              <a:t>25/05/21</a:t>
             </a:fld>
             <a:endParaRPr lang="en-BR"/>
           </a:p>
@@ -12815,7 +12983,7 @@
           <a:p>
             <a:fld id="{D5132B31-66C7-1348-BC89-1CFA582590C2}" type="datetimeFigureOut">
               <a:rPr lang="en-BR" smtClean="0"/>
-              <a:t>22/05/21</a:t>
+              <a:t>25/05/21</a:t>
             </a:fld>
             <a:endParaRPr lang="en-BR"/>
           </a:p>
@@ -13128,7 +13296,7 @@
           <a:p>
             <a:fld id="{D5132B31-66C7-1348-BC89-1CFA582590C2}" type="datetimeFigureOut">
               <a:rPr lang="en-BR" smtClean="0"/>
-              <a:t>22/05/21</a:t>
+              <a:t>25/05/21</a:t>
             </a:fld>
             <a:endParaRPr lang="en-BR"/>
           </a:p>
@@ -13417,7 +13585,7 @@
           <a:p>
             <a:fld id="{D5132B31-66C7-1348-BC89-1CFA582590C2}" type="datetimeFigureOut">
               <a:rPr lang="en-BR" smtClean="0"/>
-              <a:t>22/05/21</a:t>
+              <a:t>25/05/21</a:t>
             </a:fld>
             <a:endParaRPr lang="en-BR"/>
           </a:p>
@@ -13660,7 +13828,7 @@
           <a:p>
             <a:fld id="{D5132B31-66C7-1348-BC89-1CFA582590C2}" type="datetimeFigureOut">
               <a:rPr lang="en-BR" smtClean="0"/>
-              <a:t>22/05/21</a:t>
+              <a:t>25/05/21</a:t>
             </a:fld>
             <a:endParaRPr lang="en-BR"/>
           </a:p>
@@ -14291,51 +14459,12 @@
           <a:lstStyle/>
           <a:p>
             <a:r>
-              <a:rPr lang="en-BR" sz="4700">
+              <a:rPr lang="en-BR" sz="4700" dirty="0">
                 <a:solidFill>
                   <a:srgbClr val="FFFFFF"/>
                 </a:solidFill>
               </a:rPr>
               <a:t>Sagas: Indo além de coreografia e orquestração</a:t>
-            </a:r>
-          </a:p>
-        </p:txBody>
-      </p:sp>
-      <p:sp>
-        <p:nvSpPr>
-          <p:cNvPr id="3" name="Subtitle 2">
-            <a:extLst>
-              <a:ext uri="{FF2B5EF4-FFF2-40B4-BE49-F238E27FC236}">
-                <a16:creationId xmlns:a16="http://schemas.microsoft.com/office/drawing/2014/main" id="{6ED42C56-292B-8A4D-AC83-5C90BAFED255}"/>
-              </a:ext>
-            </a:extLst>
-          </p:cNvPr>
-          <p:cNvSpPr>
-            <a:spLocks noGrp="1"/>
-          </p:cNvSpPr>
-          <p:nvPr>
-            <p:ph type="subTitle" idx="1"/>
-          </p:nvPr>
-        </p:nvSpPr>
-        <p:spPr>
-          <a:xfrm>
-            <a:off x="3045368" y="4074718"/>
-            <a:ext cx="6105194" cy="682079"/>
-          </a:xfrm>
-        </p:spPr>
-        <p:txBody>
-          <a:bodyPr>
-            <a:normAutofit/>
-          </a:bodyPr>
-          <a:lstStyle/>
-          <a:p>
-            <a:r>
-              <a:rPr lang="en-BR">
-                <a:solidFill>
-                  <a:srgbClr val="FFFFFF"/>
-                </a:solidFill>
-              </a:rPr>
-              <a:t>Empodere seus micro-serviços com o Kobbit</a:t>
             </a:r>
           </a:p>
         </p:txBody>
@@ -14388,7 +14517,7 @@
                               <p:par>
                                 <p:cTn id="5" presetID="10" presetClass="entr" presetSubtype="0" fill="hold" grpId="0" nodeType="withEffect">
                                   <p:stCondLst>
-                                    <p:cond delay="2000"/>
+                                    <p:cond delay="500"/>
                                   </p:stCondLst>
                                   <p:iterate type="lt">
                                     <p:tmPct val="10000"/>
@@ -14397,52 +14526,6 @@
                                     <p:set>
                                       <p:cBhvr>
                                         <p:cTn id="6" dur="1" fill="hold">
-                                          <p:stCondLst>
-                                            <p:cond delay="0"/>
-                                          </p:stCondLst>
-                                        </p:cTn>
-                                        <p:tgtEl>
-                                          <p:spTgt spid="3">
-                                            <p:txEl>
-                                              <p:pRg st="0" end="0"/>
-                                            </p:txEl>
-                                          </p:spTgt>
-                                        </p:tgtEl>
-                                        <p:attrNameLst>
-                                          <p:attrName>style.visibility</p:attrName>
-                                        </p:attrNameLst>
-                                      </p:cBhvr>
-                                      <p:to>
-                                        <p:strVal val="visible"/>
-                                      </p:to>
-                                    </p:set>
-                                    <p:animEffect transition="in" filter="fade">
-                                      <p:cBhvr>
-                                        <p:cTn id="7" dur="400"/>
-                                        <p:tgtEl>
-                                          <p:spTgt spid="3">
-                                            <p:txEl>
-                                              <p:pRg st="0" end="0"/>
-                                            </p:txEl>
-                                          </p:spTgt>
-                                        </p:tgtEl>
-                                      </p:cBhvr>
-                                    </p:animEffect>
-                                  </p:childTnLst>
-                                </p:cTn>
-                              </p:par>
-                              <p:par>
-                                <p:cTn id="8" presetID="10" presetClass="entr" presetSubtype="0" fill="hold" grpId="0" nodeType="withEffect">
-                                  <p:stCondLst>
-                                    <p:cond delay="500"/>
-                                  </p:stCondLst>
-                                  <p:iterate type="lt">
-                                    <p:tmPct val="10000"/>
-                                  </p:iterate>
-                                  <p:childTnLst>
-                                    <p:set>
-                                      <p:cBhvr>
-                                        <p:cTn id="9" dur="1" fill="hold">
                                           <p:stCondLst>
                                             <p:cond delay="0"/>
                                           </p:stCondLst>
@@ -14460,7 +14543,7 @@
                                     </p:set>
                                     <p:animEffect transition="in" filter="fade">
                                       <p:cBhvr>
-                                        <p:cTn id="10" dur="400"/>
+                                        <p:cTn id="7" dur="400"/>
                                         <p:tgtEl>
                                           <p:spTgt spid="2"/>
                                         </p:tgtEl>
@@ -14498,7 +14581,6 @@
     </p:tnLst>
     <p:bldLst>
       <p:bldP spid="2" grpId="0"/>
-      <p:bldP spid="3" grpId="0" build="p"/>
     </p:bldLst>
   </p:timing>
 </p:sld>
@@ -22238,13 +22320,13 @@
   <p:clrMapOvr>
     <a:masterClrMapping/>
   </p:clrMapOvr>
-  <mc:AlternateContent xmlns:mc="http://schemas.openxmlformats.org/markup-compatibility/2006">
-    <mc:Choice xmlns:p14="http://schemas.microsoft.com/office/powerpoint/2010/main" Requires="p14">
+  <mc:AlternateContent xmlns:mc="http://schemas.openxmlformats.org/markup-compatibility/2006" xmlns:p14="http://schemas.microsoft.com/office/powerpoint/2010/main">
+    <mc:Choice Requires="p14">
       <p:transition spd="med" p14:dur="700">
         <p:fade/>
       </p:transition>
     </mc:Choice>
-    <mc:Fallback>
+    <mc:Fallback xmlns="">
       <p:transition spd="med">
         <p:fade/>
       </p:transition>
@@ -22674,13 +22756,13 @@
   <p:clrMapOvr>
     <a:overrideClrMapping bg1="dk1" tx1="lt1" bg2="dk2" tx2="lt2" accent1="accent1" accent2="accent2" accent3="accent3" accent4="accent4" accent5="accent5" accent6="accent6" hlink="hlink" folHlink="folHlink"/>
   </p:clrMapOvr>
-  <mc:AlternateContent xmlns:mc="http://schemas.openxmlformats.org/markup-compatibility/2006">
-    <mc:Choice xmlns:p14="http://schemas.microsoft.com/office/powerpoint/2010/main" Requires="p14">
+  <mc:AlternateContent xmlns:mc="http://schemas.openxmlformats.org/markup-compatibility/2006" xmlns:p14="http://schemas.microsoft.com/office/powerpoint/2010/main">
+    <mc:Choice Requires="p14">
       <p:transition spd="med" p14:dur="700">
         <p:fade/>
       </p:transition>
     </mc:Choice>
-    <mc:Fallback>
+    <mc:Fallback xmlns="">
       <p:transition spd="med">
         <p:fade/>
       </p:transition>
@@ -26062,6 +26144,18 @@
   <p:clrMapOvr>
     <a:overrideClrMapping bg1="dk1" tx1="lt1" bg2="dk2" tx2="lt2" accent1="accent1" accent2="accent2" accent3="accent3" accent4="accent4" accent5="accent5" accent6="accent6" hlink="hlink" folHlink="folHlink"/>
   </p:clrMapOvr>
+  <mc:AlternateContent xmlns:mc="http://schemas.openxmlformats.org/markup-compatibility/2006">
+    <mc:Choice xmlns:p14="http://schemas.microsoft.com/office/powerpoint/2010/main" Requires="p14">
+      <p:transition spd="med" p14:dur="700">
+        <p:fade/>
+      </p:transition>
+    </mc:Choice>
+    <mc:Fallback>
+      <p:transition spd="med">
+        <p:fade/>
+      </p:transition>
+    </mc:Fallback>
+  </mc:AlternateContent>
 </p:sld>
 </file>
 
@@ -26199,7 +26293,7 @@
           </p:nvPr>
         </p:nvPicPr>
         <p:blipFill>
-          <a:blip r:embed="rId2">
+          <a:blip r:embed="rId3">
             <a:extLst>
               <a:ext uri="{28A0092B-C50C-407E-A947-70E740481C1C}">
                 <a14:useLocalDpi xmlns:a14="http://schemas.microsoft.com/office/drawing/2010/main" val="0"/>
@@ -26743,7 +26837,7 @@
         </p:nvSpPr>
         <p:spPr>
           <a:xfrm>
-            <a:off x="7903779" y="150822"/>
+            <a:off x="7836014" y="713145"/>
             <a:ext cx="4288221" cy="5078313"/>
           </a:xfrm>
           <a:prstGeom prst="rect">
@@ -27092,7 +27186,7 @@
                   <a:schemeClr val="bg1"/>
                 </a:solidFill>
               </a:rPr>
-              <a:t>KOBBIT</a:t>
+              <a:t>SAGA-LIB</a:t>
             </a:r>
             <a:endParaRPr lang="en-BR" dirty="0">
               <a:solidFill>
@@ -27160,7 +27254,7 @@
         </p:nvSpPr>
         <p:spPr>
           <a:xfrm>
-            <a:off x="7822459" y="2228671"/>
+            <a:off x="7916065" y="2194203"/>
             <a:ext cx="4288221" cy="1200329"/>
           </a:xfrm>
           <a:prstGeom prst="rect">
@@ -27180,7 +27274,7 @@
                   <a:schemeClr val="bg1"/>
                 </a:solidFill>
               </a:rPr>
-              <a:t>E então adicionamos o Kobbit</a:t>
+              <a:t>E então adicionamos nossa Saga-lib</a:t>
             </a:r>
           </a:p>
         </p:txBody>
@@ -27199,7 +27293,7 @@
         </p:nvSpPr>
         <p:spPr>
           <a:xfrm>
-            <a:off x="7829550" y="3348990"/>
+            <a:off x="7808911" y="1374845"/>
             <a:ext cx="4288221" cy="2308324"/>
           </a:xfrm>
           <a:prstGeom prst="rect">
@@ -27238,7 +27332,7 @@
         </p:nvSpPr>
         <p:spPr>
           <a:xfrm>
-            <a:off x="8067479" y="627382"/>
+            <a:off x="7840534" y="9952"/>
             <a:ext cx="4288221" cy="1754326"/>
           </a:xfrm>
           <a:prstGeom prst="rect">
@@ -27277,7 +27371,7 @@
         </p:nvSpPr>
         <p:spPr>
           <a:xfrm>
-            <a:off x="7836641" y="4074973"/>
+            <a:off x="7741136" y="4023628"/>
             <a:ext cx="4288221" cy="2308324"/>
           </a:xfrm>
           <a:prstGeom prst="rect">
@@ -27417,7 +27511,7 @@
         </p:nvSpPr>
         <p:spPr>
           <a:xfrm>
-            <a:off x="7829549" y="33379"/>
+            <a:off x="7948980" y="3808307"/>
             <a:ext cx="4288221" cy="2308324"/>
           </a:xfrm>
           <a:prstGeom prst="rect">
@@ -27517,7 +27611,7 @@
         </p:nvSpPr>
         <p:spPr>
           <a:xfrm>
-            <a:off x="7896688" y="3043380"/>
+            <a:off x="7840533" y="2088495"/>
             <a:ext cx="4288221" cy="3416320"/>
           </a:xfrm>
           <a:prstGeom prst="rect">
@@ -27537,23 +27631,7 @@
                   <a:schemeClr val="bg1"/>
                 </a:solidFill>
               </a:rPr>
-              <a:t>O Core do </a:t>
-            </a:r>
-            <a:r>
-              <a:rPr lang="en-US" sz="3600" dirty="0" err="1">
-                <a:solidFill>
-                  <a:schemeClr val="bg1"/>
-                </a:solidFill>
-              </a:rPr>
-              <a:t>Kobbit</a:t>
-            </a:r>
-            <a:r>
-              <a:rPr lang="en-US" sz="3600" dirty="0">
-                <a:solidFill>
-                  <a:schemeClr val="bg1"/>
-                </a:solidFill>
-              </a:rPr>
-              <a:t> </a:t>
+              <a:t>O Core da Saga-lib </a:t>
             </a:r>
             <a:r>
               <a:rPr lang="en-US" sz="3600" dirty="0" err="1">
@@ -27689,7 +27767,7 @@
         </p:nvSpPr>
         <p:spPr>
           <a:xfrm>
-            <a:off x="7940893" y="1651145"/>
+            <a:off x="7863118" y="1630184"/>
             <a:ext cx="4288221" cy="2862322"/>
           </a:xfrm>
           <a:prstGeom prst="rect">
@@ -27829,7 +27907,7 @@
         </p:nvSpPr>
         <p:spPr>
           <a:xfrm>
-            <a:off x="7896688" y="2365269"/>
+            <a:off x="7777289" y="276998"/>
             <a:ext cx="4288221" cy="1200329"/>
           </a:xfrm>
           <a:prstGeom prst="rect">
@@ -32603,10 +32681,10 @@
           <p:nvPr/>
         </p:nvPicPr>
         <p:blipFill>
-          <a:blip r:embed="rId2">
+          <a:blip r:embed="rId3">
             <a:extLst>
               <a:ext uri="{96DAC541-7B7A-43D3-8B79-37D633B846F1}">
-                <asvg:svgBlip xmlns:asvg="http://schemas.microsoft.com/office/drawing/2016/SVG/main" r:embed="rId3"/>
+                <asvg:svgBlip xmlns:asvg="http://schemas.microsoft.com/office/drawing/2016/SVG/main" r:embed="rId4"/>
               </a:ext>
             </a:extLst>
           </a:blip>
@@ -32794,6 +32872,18 @@
   <p:clrMapOvr>
     <a:masterClrMapping/>
   </p:clrMapOvr>
+  <mc:AlternateContent xmlns:mc="http://schemas.openxmlformats.org/markup-compatibility/2006">
+    <mc:Choice xmlns:p14="http://schemas.microsoft.com/office/powerpoint/2010/main" Requires="p14">
+      <p:transition spd="med" p14:dur="700">
+        <p:fade/>
+      </p:transition>
+    </mc:Choice>
+    <mc:Fallback>
+      <p:transition spd="med">
+        <p:fade/>
+      </p:transition>
+    </mc:Fallback>
+  </mc:AlternateContent>
 </p:sld>
 </file>
 
@@ -40660,16 +40750,15 @@
           </p:cNvPicPr>
           <p:nvPr/>
         </p:nvPicPr>
-        <p:blipFill>
+        <p:blipFill rotWithShape="1">
           <a:blip r:embed="rId3"/>
-          <a:stretch>
-            <a:fillRect/>
-          </a:stretch>
+          <a:srcRect l="8338" t="38872"/>
+          <a:stretch/>
         </p:blipFill>
         <p:spPr>
           <a:xfrm>
-            <a:off x="1353589" y="74493"/>
-            <a:ext cx="9140522" cy="5109317"/>
+            <a:off x="804672" y="370540"/>
+            <a:ext cx="10497266" cy="3913015"/>
           </a:xfrm>
           <a:prstGeom prst="rect">
             <a:avLst/>
@@ -40690,7 +40779,7 @@
         </p:nvSpPr>
         <p:spPr>
           <a:xfrm rot="16200000">
-            <a:off x="9333334" y="2314871"/>
+            <a:off x="9614757" y="941457"/>
             <a:ext cx="347707" cy="1315730"/>
           </a:xfrm>
           <a:prstGeom prst="upArrow">
@@ -40736,7 +40825,7 @@
         </p:nvSpPr>
         <p:spPr>
           <a:xfrm>
-            <a:off x="7238135" y="3018717"/>
+            <a:off x="7519558" y="1645303"/>
             <a:ext cx="3222375" cy="461665"/>
           </a:xfrm>
           <a:prstGeom prst="rect">
@@ -40829,7 +40918,7 @@
         </p:nvSpPr>
         <p:spPr>
           <a:xfrm rot="16200000">
-            <a:off x="8741953" y="2673940"/>
+            <a:off x="8727920" y="1509835"/>
             <a:ext cx="347707" cy="2635168"/>
           </a:xfrm>
           <a:prstGeom prst="upArrow">
@@ -40878,7 +40967,7 @@
         </p:nvSpPr>
         <p:spPr>
           <a:xfrm>
-            <a:off x="7570109" y="4090818"/>
+            <a:off x="7556076" y="2926713"/>
             <a:ext cx="2890401" cy="461665"/>
           </a:xfrm>
           <a:prstGeom prst="rect">
@@ -41504,13 +41593,13 @@
   <p:clrMapOvr>
     <a:masterClrMapping/>
   </p:clrMapOvr>
-  <mc:AlternateContent xmlns:mc="http://schemas.openxmlformats.org/markup-compatibility/2006">
-    <mc:Choice xmlns:p14="http://schemas.microsoft.com/office/powerpoint/2010/main" Requires="p14">
+  <mc:AlternateContent xmlns:mc="http://schemas.openxmlformats.org/markup-compatibility/2006" xmlns:p14="http://schemas.microsoft.com/office/powerpoint/2010/main">
+    <mc:Choice Requires="p14">
       <p:transition spd="med" p14:dur="700">
         <p:fade/>
       </p:transition>
     </mc:Choice>
-    <mc:Fallback>
+    <mc:Fallback xmlns="">
       <p:transition spd="med">
         <p:fade/>
       </p:transition>
@@ -42115,13 +42204,13 @@
   <p:clrMapOvr>
     <a:masterClrMapping/>
   </p:clrMapOvr>
-  <mc:AlternateContent xmlns:mc="http://schemas.openxmlformats.org/markup-compatibility/2006">
-    <mc:Choice xmlns:p14="http://schemas.microsoft.com/office/powerpoint/2010/main" Requires="p14">
+  <mc:AlternateContent xmlns:mc="http://schemas.openxmlformats.org/markup-compatibility/2006" xmlns:p14="http://schemas.microsoft.com/office/powerpoint/2010/main">
+    <mc:Choice Requires="p14">
       <p:transition spd="med" p14:dur="700">
         <p:fade/>
       </p:transition>
     </mc:Choice>
-    <mc:Fallback>
+    <mc:Fallback xmlns="">
       <p:transition spd="med">
         <p:fade/>
       </p:transition>

</xml_diff>